<commit_message>
add gitignore, edit folder structure, add data splits, change name of file
</commit_message>
<xml_diff>
--- a/proposal/DL_project_proposal.pptx
+++ b/proposal/DL_project_proposal.pptx
@@ -1587,11 +1587,7 @@
             </a:pPr>
             <a:r>
               <a:rPr lang="en-US" dirty="0"/>
-              <a:t>May need to use </a:t>
-            </a:r>
-            <a:r>
-              <a:rPr lang="en-US"/>
-              <a:t>pretrained weights</a:t>
+              <a:t>May need to use pretrained weights</a:t>
             </a:r>
           </a:p>
           <a:p>
@@ -1605,7 +1601,68 @@
               <a:buFontTx/>
               <a:buChar char="-"/>
             </a:pPr>
-            <a:endParaRPr dirty="0"/>
+            <a:endParaRPr lang="en-US" dirty="0"/>
+          </a:p>
+          <a:p>
+            <a:pPr marL="285750" lvl="0" indent="-285750" algn="l" rtl="0">
+              <a:spcBef>
+                <a:spcPts val="0"/>
+              </a:spcBef>
+              <a:spcAft>
+                <a:spcPts val="0"/>
+              </a:spcAft>
+              <a:buFontTx/>
+              <a:buChar char="-"/>
+            </a:pPr>
+            <a:r>
+              <a:rPr lang="en-US" dirty="0"/>
+              <a:t>1. run mamba</a:t>
+            </a:r>
+          </a:p>
+          <a:p>
+            <a:pPr marL="285750" lvl="0" indent="-285750" algn="l" rtl="0">
+              <a:spcBef>
+                <a:spcPts val="0"/>
+              </a:spcBef>
+              <a:spcAft>
+                <a:spcPts val="0"/>
+              </a:spcAft>
+              <a:buFontTx/>
+              <a:buChar char="-"/>
+            </a:pPr>
+            <a:r>
+              <a:rPr lang="en-US" dirty="0"/>
+              <a:t>2. test segmentation and classification at the same time</a:t>
+            </a:r>
+          </a:p>
+          <a:p>
+            <a:pPr marL="285750" lvl="0" indent="-285750" algn="l" rtl="0">
+              <a:spcBef>
+                <a:spcPts val="0"/>
+              </a:spcBef>
+              <a:spcAft>
+                <a:spcPts val="0"/>
+              </a:spcAft>
+              <a:buFontTx/>
+              <a:buChar char="-"/>
+            </a:pPr>
+            <a:r>
+              <a:rPr lang="en-US" dirty="0"/>
+              <a:t>3. traditional UNET, maybe others</a:t>
+            </a:r>
+          </a:p>
+          <a:p>
+            <a:pPr marL="285750" lvl="0" indent="-285750" algn="l" rtl="0">
+              <a:spcBef>
+                <a:spcPts val="0"/>
+              </a:spcBef>
+              <a:spcAft>
+                <a:spcPts val="0"/>
+              </a:spcAft>
+              <a:buFontTx/>
+              <a:buChar char="-"/>
+            </a:pPr>
+            <a:endParaRPr lang="en-US" dirty="0"/>
           </a:p>
         </p:txBody>
       </p:sp>

</xml_diff>